<commit_message>
small tweaks to the slides. I had good morning/afternoon backwards in the two powerpoint files.
</commit_message>
<xml_diff>
--- a/01. ConFoo2023 - Rapid prototyping with the help of Docker.pptx
+++ b/01. ConFoo2023 - Rapid prototyping with the help of Docker.pptx
@@ -228,7 +228,7 @@
           <a:p>
             <a:fld id="{5C385B3F-E6ED-484E-9C7E-DD76C6A68896}" type="datetimeFigureOut">
               <a:rPr lang="en-US" smtClean="0"/>
-              <a:t>2/22/2023</a:t>
+              <a:t>2/23/2023</a:t>
             </a:fld>
             <a:endParaRPr lang="en-US"/>
           </a:p>
@@ -1095,6 +1095,24 @@
           <a:lstStyle/>
           <a:p>
             <a:r>
+              <a:rPr lang="en-US" sz="1800" b="1" i="1">
+                <a:solidFill>
+                  <a:srgbClr val="7030A0"/>
+                </a:solidFill>
+                <a:effectLst/>
+                <a:latin typeface="Calibri" panose="020F0502020204030204" pitchFamily="34" charset="0"/>
+                <a:ea typeface="Calibri" panose="020F0502020204030204" pitchFamily="34" charset="0"/>
+                <a:cs typeface="Times New Roman" panose="02020603050405020304" pitchFamily="18" charset="0"/>
+              </a:rPr>
+              <a:t>Quickly show Timesheet so that people can visualize what I’m talking about below</a:t>
+            </a:r>
+            <a:endParaRPr lang="en-US" b="1" dirty="0"/>
+          </a:p>
+          <a:p>
+            <a:endParaRPr lang="en-US" dirty="0"/>
+          </a:p>
+          <a:p>
+            <a:r>
               <a:rPr lang="en-US" dirty="0"/>
               <a:t>Looking at where we were…</a:t>
             </a:r>
@@ -2184,7 +2202,7 @@
           <a:p>
             <a:fld id="{08B15B53-BA0B-46B7-9831-4A77F84F3E8E}" type="datetimeFigureOut">
               <a:rPr lang="en-US" smtClean="0"/>
-              <a:t>2/22/2023</a:t>
+              <a:t>2/23/2023</a:t>
             </a:fld>
             <a:endParaRPr lang="en-US"/>
           </a:p>
@@ -2382,7 +2400,7 @@
           <a:p>
             <a:fld id="{08B15B53-BA0B-46B7-9831-4A77F84F3E8E}" type="datetimeFigureOut">
               <a:rPr lang="en-US" smtClean="0"/>
-              <a:t>2/22/2023</a:t>
+              <a:t>2/23/2023</a:t>
             </a:fld>
             <a:endParaRPr lang="en-US"/>
           </a:p>
@@ -2590,7 +2608,7 @@
           <a:p>
             <a:fld id="{08B15B53-BA0B-46B7-9831-4A77F84F3E8E}" type="datetimeFigureOut">
               <a:rPr lang="en-US" smtClean="0"/>
-              <a:t>2/22/2023</a:t>
+              <a:t>2/23/2023</a:t>
             </a:fld>
             <a:endParaRPr lang="en-US"/>
           </a:p>
@@ -2788,7 +2806,7 @@
           <a:p>
             <a:fld id="{08B15B53-BA0B-46B7-9831-4A77F84F3E8E}" type="datetimeFigureOut">
               <a:rPr lang="en-US" smtClean="0"/>
-              <a:t>2/22/2023</a:t>
+              <a:t>2/23/2023</a:t>
             </a:fld>
             <a:endParaRPr lang="en-US"/>
           </a:p>
@@ -3063,7 +3081,7 @@
           <a:p>
             <a:fld id="{08B15B53-BA0B-46B7-9831-4A77F84F3E8E}" type="datetimeFigureOut">
               <a:rPr lang="en-US" smtClean="0"/>
-              <a:t>2/22/2023</a:t>
+              <a:t>2/23/2023</a:t>
             </a:fld>
             <a:endParaRPr lang="en-US"/>
           </a:p>
@@ -3328,7 +3346,7 @@
           <a:p>
             <a:fld id="{08B15B53-BA0B-46B7-9831-4A77F84F3E8E}" type="datetimeFigureOut">
               <a:rPr lang="en-US" smtClean="0"/>
-              <a:t>2/22/2023</a:t>
+              <a:t>2/23/2023</a:t>
             </a:fld>
             <a:endParaRPr lang="en-US"/>
           </a:p>
@@ -3740,7 +3758,7 @@
           <a:p>
             <a:fld id="{08B15B53-BA0B-46B7-9831-4A77F84F3E8E}" type="datetimeFigureOut">
               <a:rPr lang="en-US" smtClean="0"/>
-              <a:t>2/22/2023</a:t>
+              <a:t>2/23/2023</a:t>
             </a:fld>
             <a:endParaRPr lang="en-US"/>
           </a:p>
@@ -3881,7 +3899,7 @@
           <a:p>
             <a:fld id="{08B15B53-BA0B-46B7-9831-4A77F84F3E8E}" type="datetimeFigureOut">
               <a:rPr lang="en-US" smtClean="0"/>
-              <a:t>2/22/2023</a:t>
+              <a:t>2/23/2023</a:t>
             </a:fld>
             <a:endParaRPr lang="en-US"/>
           </a:p>
@@ -3994,7 +4012,7 @@
           <a:p>
             <a:fld id="{08B15B53-BA0B-46B7-9831-4A77F84F3E8E}" type="datetimeFigureOut">
               <a:rPr lang="en-US" smtClean="0"/>
-              <a:t>2/22/2023</a:t>
+              <a:t>2/23/2023</a:t>
             </a:fld>
             <a:endParaRPr lang="en-US"/>
           </a:p>
@@ -4305,7 +4323,7 @@
           <a:p>
             <a:fld id="{08B15B53-BA0B-46B7-9831-4A77F84F3E8E}" type="datetimeFigureOut">
               <a:rPr lang="en-US" smtClean="0"/>
-              <a:t>2/22/2023</a:t>
+              <a:t>2/23/2023</a:t>
             </a:fld>
             <a:endParaRPr lang="en-US"/>
           </a:p>
@@ -4593,7 +4611,7 @@
           <a:p>
             <a:fld id="{08B15B53-BA0B-46B7-9831-4A77F84F3E8E}" type="datetimeFigureOut">
               <a:rPr lang="en-US" smtClean="0"/>
-              <a:t>2/22/2023</a:t>
+              <a:t>2/23/2023</a:t>
             </a:fld>
             <a:endParaRPr lang="en-US"/>
           </a:p>
@@ -4834,7 +4852,7 @@
           <a:p>
             <a:fld id="{08B15B53-BA0B-46B7-9831-4A77F84F3E8E}" type="datetimeFigureOut">
               <a:rPr lang="en-US" smtClean="0"/>
-              <a:t>2/22/2023</a:t>
+              <a:t>2/23/2023</a:t>
             </a:fld>
             <a:endParaRPr lang="en-US"/>
           </a:p>

</xml_diff>